<commit_message>
Update flowchart related to issue #13
</commit_message>
<xml_diff>
--- a/figures/Powerpoint/DesginFlowcharts.pptx
+++ b/figures/Powerpoint/DesginFlowcharts.pptx
@@ -246,7 +246,7 @@
           <a:p>
             <a:fld id="{7854B9CE-4D77-C740-9A68-E4BD7A7A0860}" type="datetimeFigureOut">
               <a:rPr lang="en-GB" smtClean="0"/>
-              <a:t>04/06/2019</a:t>
+              <a:t>13/06/2019</a:t>
             </a:fld>
             <a:endParaRPr lang="en-GB"/>
           </a:p>
@@ -416,7 +416,7 @@
           <a:p>
             <a:fld id="{7854B9CE-4D77-C740-9A68-E4BD7A7A0860}" type="datetimeFigureOut">
               <a:rPr lang="en-GB" smtClean="0"/>
-              <a:t>04/06/2019</a:t>
+              <a:t>13/06/2019</a:t>
             </a:fld>
             <a:endParaRPr lang="en-GB"/>
           </a:p>
@@ -596,7 +596,7 @@
           <a:p>
             <a:fld id="{7854B9CE-4D77-C740-9A68-E4BD7A7A0860}" type="datetimeFigureOut">
               <a:rPr lang="en-GB" smtClean="0"/>
-              <a:t>04/06/2019</a:t>
+              <a:t>13/06/2019</a:t>
             </a:fld>
             <a:endParaRPr lang="en-GB"/>
           </a:p>
@@ -766,7 +766,7 @@
           <a:p>
             <a:fld id="{7854B9CE-4D77-C740-9A68-E4BD7A7A0860}" type="datetimeFigureOut">
               <a:rPr lang="en-GB" smtClean="0"/>
-              <a:t>04/06/2019</a:t>
+              <a:t>13/06/2019</a:t>
             </a:fld>
             <a:endParaRPr lang="en-GB"/>
           </a:p>
@@ -1010,7 +1010,7 @@
           <a:p>
             <a:fld id="{7854B9CE-4D77-C740-9A68-E4BD7A7A0860}" type="datetimeFigureOut">
               <a:rPr lang="en-GB" smtClean="0"/>
-              <a:t>04/06/2019</a:t>
+              <a:t>13/06/2019</a:t>
             </a:fld>
             <a:endParaRPr lang="en-GB"/>
           </a:p>
@@ -1242,7 +1242,7 @@
           <a:p>
             <a:fld id="{7854B9CE-4D77-C740-9A68-E4BD7A7A0860}" type="datetimeFigureOut">
               <a:rPr lang="en-GB" smtClean="0"/>
-              <a:t>04/06/2019</a:t>
+              <a:t>13/06/2019</a:t>
             </a:fld>
             <a:endParaRPr lang="en-GB"/>
           </a:p>
@@ -1609,7 +1609,7 @@
           <a:p>
             <a:fld id="{7854B9CE-4D77-C740-9A68-E4BD7A7A0860}" type="datetimeFigureOut">
               <a:rPr lang="en-GB" smtClean="0"/>
-              <a:t>04/06/2019</a:t>
+              <a:t>13/06/2019</a:t>
             </a:fld>
             <a:endParaRPr lang="en-GB"/>
           </a:p>
@@ -1727,7 +1727,7 @@
           <a:p>
             <a:fld id="{7854B9CE-4D77-C740-9A68-E4BD7A7A0860}" type="datetimeFigureOut">
               <a:rPr lang="en-GB" smtClean="0"/>
-              <a:t>04/06/2019</a:t>
+              <a:t>13/06/2019</a:t>
             </a:fld>
             <a:endParaRPr lang="en-GB"/>
           </a:p>
@@ -1822,7 +1822,7 @@
           <a:p>
             <a:fld id="{7854B9CE-4D77-C740-9A68-E4BD7A7A0860}" type="datetimeFigureOut">
               <a:rPr lang="en-GB" smtClean="0"/>
-              <a:t>04/06/2019</a:t>
+              <a:t>13/06/2019</a:t>
             </a:fld>
             <a:endParaRPr lang="en-GB"/>
           </a:p>
@@ -2099,7 +2099,7 @@
           <a:p>
             <a:fld id="{7854B9CE-4D77-C740-9A68-E4BD7A7A0860}" type="datetimeFigureOut">
               <a:rPr lang="en-GB" smtClean="0"/>
-              <a:t>04/06/2019</a:t>
+              <a:t>13/06/2019</a:t>
             </a:fld>
             <a:endParaRPr lang="en-GB"/>
           </a:p>
@@ -2356,7 +2356,7 @@
           <a:p>
             <a:fld id="{7854B9CE-4D77-C740-9A68-E4BD7A7A0860}" type="datetimeFigureOut">
               <a:rPr lang="en-GB" smtClean="0"/>
-              <a:t>04/06/2019</a:t>
+              <a:t>13/06/2019</a:t>
             </a:fld>
             <a:endParaRPr lang="en-GB"/>
           </a:p>
@@ -2569,7 +2569,7 @@
           <a:p>
             <a:fld id="{7854B9CE-4D77-C740-9A68-E4BD7A7A0860}" type="datetimeFigureOut">
               <a:rPr lang="en-GB" smtClean="0"/>
-              <a:t>04/06/2019</a:t>
+              <a:t>13/06/2019</a:t>
             </a:fld>
             <a:endParaRPr lang="en-GB"/>
           </a:p>
@@ -6901,8 +6901,8 @@
           </a:fontRef>
         </p:style>
       </p:cxnSp>
-      <mc:AlternateContent xmlns:mc="http://schemas.openxmlformats.org/markup-compatibility/2006">
-        <mc:Choice xmlns:a14="http://schemas.microsoft.com/office/drawing/2010/main" Requires="a14">
+      <mc:AlternateContent xmlns:mc="http://schemas.openxmlformats.org/markup-compatibility/2006" xmlns:a14="http://schemas.microsoft.com/office/drawing/2010/main">
+        <mc:Choice Requires="a14">
           <p:sp>
             <p:nvSpPr>
               <p:cNvPr id="68" name="TextBox 67">
@@ -7017,7 +7017,7 @@
             </p:txBody>
           </p:sp>
         </mc:Choice>
-        <mc:Fallback>
+        <mc:Fallback xmlns="">
           <p:sp>
             <p:nvSpPr>
               <p:cNvPr id="68" name="TextBox 67">
@@ -7240,8 +7240,8 @@
           </a:p>
         </p:txBody>
       </p:sp>
-      <mc:AlternateContent xmlns:mc="http://schemas.openxmlformats.org/markup-compatibility/2006">
-        <mc:Choice xmlns:a14="http://schemas.microsoft.com/office/drawing/2010/main" Requires="a14">
+      <mc:AlternateContent xmlns:mc="http://schemas.openxmlformats.org/markup-compatibility/2006" xmlns:a14="http://schemas.microsoft.com/office/drawing/2010/main">
+        <mc:Choice Requires="a14">
           <p:sp>
             <p:nvSpPr>
               <p:cNvPr id="86" name="TextBox 85">
@@ -7353,7 +7353,7 @@
             </p:txBody>
           </p:sp>
         </mc:Choice>
-        <mc:Fallback>
+        <mc:Fallback xmlns="">
           <p:sp>
             <p:nvSpPr>
               <p:cNvPr id="86" name="TextBox 85">
@@ -7444,8 +7444,8 @@
           </a:p>
         </p:txBody>
       </p:sp>
-      <mc:AlternateContent xmlns:mc="http://schemas.openxmlformats.org/markup-compatibility/2006">
-        <mc:Choice xmlns:a14="http://schemas.microsoft.com/office/drawing/2010/main" Requires="a14">
+      <mc:AlternateContent xmlns:mc="http://schemas.openxmlformats.org/markup-compatibility/2006" xmlns:a14="http://schemas.microsoft.com/office/drawing/2010/main">
+        <mc:Choice Requires="a14">
           <p:sp>
             <p:nvSpPr>
               <p:cNvPr id="91" name="TextBox 90">
@@ -7751,7 +7751,7 @@
             </p:txBody>
           </p:sp>
         </mc:Choice>
-        <mc:Fallback>
+        <mc:Fallback xmlns="">
           <p:sp>
             <p:nvSpPr>
               <p:cNvPr id="91" name="TextBox 90">
@@ -7844,8 +7844,8 @@
           </a:p>
         </p:txBody>
       </p:sp>
-      <mc:AlternateContent xmlns:mc="http://schemas.openxmlformats.org/markup-compatibility/2006">
-        <mc:Choice xmlns:a14="http://schemas.microsoft.com/office/drawing/2010/main" Requires="a14">
+      <mc:AlternateContent xmlns:mc="http://schemas.openxmlformats.org/markup-compatibility/2006" xmlns:a14="http://schemas.microsoft.com/office/drawing/2010/main">
+        <mc:Choice Requires="a14">
           <p:sp>
             <p:nvSpPr>
               <p:cNvPr id="133" name="TextBox 132">
@@ -8351,7 +8351,7 @@
             </p:txBody>
           </p:sp>
         </mc:Choice>
-        <mc:Fallback>
+        <mc:Fallback xmlns="">
           <p:sp>
             <p:nvSpPr>
               <p:cNvPr id="133" name="TextBox 132">
@@ -8910,8 +8910,8 @@
           </a:fontRef>
         </p:style>
       </p:cxnSp>
-      <mc:AlternateContent xmlns:mc="http://schemas.openxmlformats.org/markup-compatibility/2006">
-        <mc:Choice xmlns:a14="http://schemas.microsoft.com/office/drawing/2010/main" Requires="a14">
+      <mc:AlternateContent xmlns:mc="http://schemas.openxmlformats.org/markup-compatibility/2006" xmlns:a14="http://schemas.microsoft.com/office/drawing/2010/main">
+        <mc:Choice Requires="a14">
           <p:sp>
             <p:nvSpPr>
               <p:cNvPr id="184" name="Rectangle 183">
@@ -8991,7 +8991,7 @@
             </p:txBody>
           </p:sp>
         </mc:Choice>
-        <mc:Fallback>
+        <mc:Fallback xmlns="">
           <p:sp>
             <p:nvSpPr>
               <p:cNvPr id="184" name="Rectangle 183">
@@ -10826,8 +10826,8 @@
           </a:fontRef>
         </p:style>
       </p:cxnSp>
-      <mc:AlternateContent xmlns:mc="http://schemas.openxmlformats.org/markup-compatibility/2006">
-        <mc:Choice xmlns:a14="http://schemas.microsoft.com/office/drawing/2010/main" Requires="a14">
+      <mc:AlternateContent xmlns:mc="http://schemas.openxmlformats.org/markup-compatibility/2006" xmlns:a14="http://schemas.microsoft.com/office/drawing/2010/main">
+        <mc:Choice Requires="a14">
           <p:sp>
             <p:nvSpPr>
               <p:cNvPr id="252" name="Rectangle 251">
@@ -10907,7 +10907,7 @@
             </p:txBody>
           </p:sp>
         </mc:Choice>
-        <mc:Fallback>
+        <mc:Fallback xmlns="">
           <p:sp>
             <p:nvSpPr>
               <p:cNvPr id="252" name="Rectangle 251">
@@ -12442,21 +12442,35 @@
                     <a:latin typeface="Calibri" panose="020F0502020204030204" pitchFamily="34" charset="0"/>
                     <a:cs typeface="Calibri" panose="020F0502020204030204" pitchFamily="34" charset="0"/>
                   </a:rPr>
-                  <a:t> of </a:t>
+                  <a:t> </a:t>
                 </a:r>
                 <a:r>
-                  <a:rPr lang="en-GB" i="1" dirty="0" err="1">
+                  <a:rPr lang="en-GB">
                     <a:latin typeface="Calibri" panose="020F0502020204030204" pitchFamily="34" charset="0"/>
                     <a:cs typeface="Calibri" panose="020F0502020204030204" pitchFamily="34" charset="0"/>
                   </a:rPr>
-                  <a:t>coinbase</a:t>
+                  <a:t>of </a:t>
+                </a:r>
+                <a:r>
+                  <a:rPr lang="en-GB" i="1">
+                    <a:latin typeface="Calibri" panose="020F0502020204030204" pitchFamily="34" charset="0"/>
+                    <a:cs typeface="Calibri" panose="020F0502020204030204" pitchFamily="34" charset="0"/>
+                  </a:rPr>
+                  <a:t>compensation</a:t>
+                </a:r>
+                <a:r>
+                  <a:rPr lang="en-GB">
+                    <a:latin typeface="Calibri" panose="020F0502020204030204" pitchFamily="34" charset="0"/>
+                    <a:cs typeface="Calibri" panose="020F0502020204030204" pitchFamily="34" charset="0"/>
+                  </a:rPr>
+                  <a:t> </a:t>
                 </a:r>
                 <a:r>
                   <a:rPr lang="en-GB" dirty="0">
                     <a:latin typeface="Calibri" panose="020F0502020204030204" pitchFamily="34" charset="0"/>
                     <a:cs typeface="Calibri" panose="020F0502020204030204" pitchFamily="34" charset="0"/>
                   </a:rPr>
-                  <a:t> entries for each producer with identifier verifiably in </a:t>
+                  <a:t>entries for each producer with identifier verifiably in </a:t>
                 </a:r>
                 <a14:m>
                   <m:oMath xmlns:m="http://schemas.openxmlformats.org/officeDocument/2006/math">
@@ -12636,8 +12650,8 @@
           </p:sp>
         </mc:Fallback>
       </mc:AlternateContent>
-      <mc:AlternateContent xmlns:mc="http://schemas.openxmlformats.org/markup-compatibility/2006">
-        <mc:Choice xmlns:a14="http://schemas.microsoft.com/office/drawing/2010/main" Requires="a14">
+      <mc:AlternateContent xmlns:mc="http://schemas.openxmlformats.org/markup-compatibility/2006" xmlns:a14="http://schemas.microsoft.com/office/drawing/2010/main">
+        <mc:Choice Requires="a14">
           <p:sp>
             <p:nvSpPr>
               <p:cNvPr id="170" name="Rectangle 169">
@@ -13055,7 +13069,7 @@
             </p:txBody>
           </p:sp>
         </mc:Choice>
-        <mc:Fallback>
+        <mc:Fallback xmlns="">
           <p:sp>
             <p:nvSpPr>
               <p:cNvPr id="170" name="Rectangle 169">
@@ -13105,8 +13119,8 @@
           </p:sp>
         </mc:Fallback>
       </mc:AlternateContent>
-      <mc:AlternateContent xmlns:mc="http://schemas.openxmlformats.org/markup-compatibility/2006">
-        <mc:Choice xmlns:a14="http://schemas.microsoft.com/office/drawing/2010/main" Requires="a14">
+      <mc:AlternateContent xmlns:mc="http://schemas.openxmlformats.org/markup-compatibility/2006" xmlns:a14="http://schemas.microsoft.com/office/drawing/2010/main">
+        <mc:Choice Requires="a14">
           <p:sp>
             <p:nvSpPr>
               <p:cNvPr id="171" name="Rectangle 170">
@@ -13206,7 +13220,7 @@
             </p:txBody>
           </p:sp>
         </mc:Choice>
-        <mc:Fallback>
+        <mc:Fallback xmlns="">
           <p:sp>
             <p:nvSpPr>
               <p:cNvPr id="171" name="Rectangle 170">
@@ -14531,8 +14545,8 @@
           </a:fontRef>
         </p:style>
       </p:cxnSp>
-      <mc:AlternateContent xmlns:mc="http://schemas.openxmlformats.org/markup-compatibility/2006">
-        <mc:Choice xmlns:a14="http://schemas.microsoft.com/office/drawing/2010/main" Requires="a14">
+      <mc:AlternateContent xmlns:mc="http://schemas.openxmlformats.org/markup-compatibility/2006" xmlns:a14="http://schemas.microsoft.com/office/drawing/2010/main">
+        <mc:Choice Requires="a14">
           <p:sp>
             <p:nvSpPr>
               <p:cNvPr id="234" name="Rectangle 233">
@@ -14612,7 +14626,7 @@
             </p:txBody>
           </p:sp>
         </mc:Choice>
-        <mc:Fallback>
+        <mc:Fallback xmlns="">
           <p:sp>
             <p:nvSpPr>
               <p:cNvPr id="234" name="Rectangle 233">

</xml_diff>

<commit_message>
Update document name and title
</commit_message>
<xml_diff>
--- a/figures/Powerpoint/DesginFlowcharts.pptx
+++ b/figures/Powerpoint/DesginFlowcharts.pptx
@@ -246,7 +246,7 @@
           <a:p>
             <a:fld id="{7854B9CE-4D77-C740-9A68-E4BD7A7A0860}" type="datetimeFigureOut">
               <a:rPr lang="en-GB" smtClean="0"/>
-              <a:t>13/06/2019</a:t>
+              <a:t>26/06/2019</a:t>
             </a:fld>
             <a:endParaRPr lang="en-GB"/>
           </a:p>
@@ -416,7 +416,7 @@
           <a:p>
             <a:fld id="{7854B9CE-4D77-C740-9A68-E4BD7A7A0860}" type="datetimeFigureOut">
               <a:rPr lang="en-GB" smtClean="0"/>
-              <a:t>13/06/2019</a:t>
+              <a:t>26/06/2019</a:t>
             </a:fld>
             <a:endParaRPr lang="en-GB"/>
           </a:p>
@@ -596,7 +596,7 @@
           <a:p>
             <a:fld id="{7854B9CE-4D77-C740-9A68-E4BD7A7A0860}" type="datetimeFigureOut">
               <a:rPr lang="en-GB" smtClean="0"/>
-              <a:t>13/06/2019</a:t>
+              <a:t>26/06/2019</a:t>
             </a:fld>
             <a:endParaRPr lang="en-GB"/>
           </a:p>
@@ -766,7 +766,7 @@
           <a:p>
             <a:fld id="{7854B9CE-4D77-C740-9A68-E4BD7A7A0860}" type="datetimeFigureOut">
               <a:rPr lang="en-GB" smtClean="0"/>
-              <a:t>13/06/2019</a:t>
+              <a:t>26/06/2019</a:t>
             </a:fld>
             <a:endParaRPr lang="en-GB"/>
           </a:p>
@@ -1010,7 +1010,7 @@
           <a:p>
             <a:fld id="{7854B9CE-4D77-C740-9A68-E4BD7A7A0860}" type="datetimeFigureOut">
               <a:rPr lang="en-GB" smtClean="0"/>
-              <a:t>13/06/2019</a:t>
+              <a:t>26/06/2019</a:t>
             </a:fld>
             <a:endParaRPr lang="en-GB"/>
           </a:p>
@@ -1242,7 +1242,7 @@
           <a:p>
             <a:fld id="{7854B9CE-4D77-C740-9A68-E4BD7A7A0860}" type="datetimeFigureOut">
               <a:rPr lang="en-GB" smtClean="0"/>
-              <a:t>13/06/2019</a:t>
+              <a:t>26/06/2019</a:t>
             </a:fld>
             <a:endParaRPr lang="en-GB"/>
           </a:p>
@@ -1609,7 +1609,7 @@
           <a:p>
             <a:fld id="{7854B9CE-4D77-C740-9A68-E4BD7A7A0860}" type="datetimeFigureOut">
               <a:rPr lang="en-GB" smtClean="0"/>
-              <a:t>13/06/2019</a:t>
+              <a:t>26/06/2019</a:t>
             </a:fld>
             <a:endParaRPr lang="en-GB"/>
           </a:p>
@@ -1727,7 +1727,7 @@
           <a:p>
             <a:fld id="{7854B9CE-4D77-C740-9A68-E4BD7A7A0860}" type="datetimeFigureOut">
               <a:rPr lang="en-GB" smtClean="0"/>
-              <a:t>13/06/2019</a:t>
+              <a:t>26/06/2019</a:t>
             </a:fld>
             <a:endParaRPr lang="en-GB"/>
           </a:p>
@@ -1822,7 +1822,7 @@
           <a:p>
             <a:fld id="{7854B9CE-4D77-C740-9A68-E4BD7A7A0860}" type="datetimeFigureOut">
               <a:rPr lang="en-GB" smtClean="0"/>
-              <a:t>13/06/2019</a:t>
+              <a:t>26/06/2019</a:t>
             </a:fld>
             <a:endParaRPr lang="en-GB"/>
           </a:p>
@@ -2099,7 +2099,7 @@
           <a:p>
             <a:fld id="{7854B9CE-4D77-C740-9A68-E4BD7A7A0860}" type="datetimeFigureOut">
               <a:rPr lang="en-GB" smtClean="0"/>
-              <a:t>13/06/2019</a:t>
+              <a:t>26/06/2019</a:t>
             </a:fld>
             <a:endParaRPr lang="en-GB"/>
           </a:p>
@@ -2356,7 +2356,7 @@
           <a:p>
             <a:fld id="{7854B9CE-4D77-C740-9A68-E4BD7A7A0860}" type="datetimeFigureOut">
               <a:rPr lang="en-GB" smtClean="0"/>
-              <a:t>13/06/2019</a:t>
+              <a:t>26/06/2019</a:t>
             </a:fld>
             <a:endParaRPr lang="en-GB"/>
           </a:p>
@@ -2569,7 +2569,7 @@
           <a:p>
             <a:fld id="{7854B9CE-4D77-C740-9A68-E4BD7A7A0860}" type="datetimeFigureOut">
               <a:rPr lang="en-GB" smtClean="0"/>
-              <a:t>13/06/2019</a:t>
+              <a:t>26/06/2019</a:t>
             </a:fld>
             <a:endParaRPr lang="en-GB"/>
           </a:p>
@@ -6489,8 +6489,8 @@
           </p:sp>
         </mc:Fallback>
       </mc:AlternateContent>
-      <mc:AlternateContent xmlns:mc="http://schemas.openxmlformats.org/markup-compatibility/2006" xmlns:a14="http://schemas.microsoft.com/office/drawing/2010/main">
-        <mc:Choice Requires="a14">
+      <mc:AlternateContent xmlns:mc="http://schemas.openxmlformats.org/markup-compatibility/2006">
+        <mc:Choice xmlns:a14="http://schemas.microsoft.com/office/drawing/2010/main" Requires="a14">
           <p:sp>
             <p:nvSpPr>
               <p:cNvPr id="59" name="TextBox 58">
@@ -6506,7 +6506,7 @@
             <p:spPr>
               <a:xfrm>
                 <a:off x="5888889" y="15548791"/>
-                <a:ext cx="5476303" cy="395045"/>
+                <a:ext cx="4403315" cy="395045"/>
               </a:xfrm>
               <a:prstGeom prst="rect">
                 <a:avLst/>
@@ -6607,16 +6607,28 @@
                           </a:rPr>
                           <m:t>j</m:t>
                         </m:r>
+                        <m:r>
+                          <a:rPr lang="en-GB" b="0" i="1" smtClean="0">
+                            <a:latin typeface="Cambria Math" panose="02040503050406030204" pitchFamily="18" charset="0"/>
+                          </a:rPr>
+                          <m:t> </m:t>
+                        </m:r>
                       </m:sub>
                     </m:sSub>
                     <m:r>
                       <a:rPr lang="en-GB" i="1">
                         <a:latin typeface="Cambria Math" panose="02040503050406030204" pitchFamily="18" charset="0"/>
                       </a:rPr>
-                      <m:t>+</m:t>
+                      <m:t>||</m:t>
                     </m:r>
                     <m:r>
-                      <a:rPr lang="en-GB" i="1">
+                      <a:rPr lang="en-GB" b="0" i="1" smtClean="0">
+                        <a:latin typeface="Cambria Math" panose="02040503050406030204" pitchFamily="18" charset="0"/>
+                      </a:rPr>
+                      <m:t> </m:t>
+                    </m:r>
+                    <m:r>
+                      <a:rPr lang="en-GB" b="0" i="1" smtClean="0">
                         <a:latin typeface="Cambria Math" panose="02040503050406030204" pitchFamily="18" charset="0"/>
                       </a:rPr>
                       <m:t>𝐼</m:t>
@@ -6702,34 +6714,16 @@
                       <m:t>=</m:t>
                     </m:r>
                     <m:r>
-                      <m:rPr>
-                        <m:sty m:val="p"/>
-                      </m:rPr>
-                      <a:rPr lang="en-GB" b="0" i="0" smtClean="0">
+                      <a:rPr lang="en-GB" b="0" i="1" smtClean="0">
                         <a:latin typeface="Cambria Math" panose="02040503050406030204" pitchFamily="18" charset="0"/>
                       </a:rPr>
-                      <m:t>blake</m:t>
+                      <m:t>𝐻</m:t>
                     </m:r>
                     <m:r>
                       <a:rPr lang="en-GB" b="0" i="0" smtClean="0">
                         <a:latin typeface="Cambria Math" panose="02040503050406030204" pitchFamily="18" charset="0"/>
                       </a:rPr>
-                      <m:t>2</m:t>
-                    </m:r>
-                    <m:r>
-                      <m:rPr>
-                        <m:sty m:val="p"/>
-                      </m:rPr>
-                      <a:rPr lang="en-GB" b="0" i="0" smtClean="0">
-                        <a:latin typeface="Cambria Math" panose="02040503050406030204" pitchFamily="18" charset="0"/>
-                      </a:rPr>
-                      <m:t>b</m:t>
-                    </m:r>
-                    <m:r>
-                      <a:rPr lang="en-GB" b="0" i="0" smtClean="0">
-                        <a:latin typeface="Cambria Math" panose="02040503050406030204" pitchFamily="18" charset="0"/>
-                      </a:rPr>
-                      <m:t>256(</m:t>
+                      <m:t>(</m:t>
                     </m:r>
                     <m:r>
                       <a:rPr lang="en-GB" i="1">
@@ -6803,7 +6797,7 @@
             </p:txBody>
           </p:sp>
         </mc:Choice>
-        <mc:Fallback xmlns="">
+        <mc:Fallback>
           <p:sp>
             <p:nvSpPr>
               <p:cNvPr id="59" name="TextBox 58">
@@ -6821,7 +6815,7 @@
             <p:spPr>
               <a:xfrm>
                 <a:off x="5888889" y="15548791"/>
-                <a:ext cx="5476303" cy="395045"/>
+                <a:ext cx="4403315" cy="395045"/>
               </a:xfrm>
               <a:prstGeom prst="rect">
                 <a:avLst/>
@@ -6829,7 +6823,7 @@
               <a:blipFill>
                 <a:blip r:embed="rId9"/>
                 <a:stretch>
-                  <a:fillRect l="-924" t="-6250" b="-12500"/>
+                  <a:fillRect l="-1149" t="-6250" b="-12500"/>
                 </a:stretch>
               </a:blipFill>
               <a:ln>
@@ -6843,7 +6837,7 @@
               <a:lstStyle/>
               <a:p>
                 <a:r>
-                  <a:rPr lang="en-US">
+                  <a:rPr lang="en-GB">
                     <a:noFill/>
                   </a:rPr>
                   <a:t> </a:t>
@@ -8637,15 +8631,13 @@
           </p:cNvPr>
           <p:cNvCxnSpPr>
             <a:cxnSpLocks/>
-            <a:stCxn id="59" idx="3"/>
-            <a:endCxn id="155" idx="1"/>
           </p:cNvCxnSpPr>
           <p:nvPr/>
         </p:nvCxnSpPr>
         <p:spPr>
           <a:xfrm>
-            <a:off x="11365192" y="15746314"/>
-            <a:ext cx="947857" cy="0"/>
+            <a:off x="10292204" y="15746314"/>
+            <a:ext cx="2020844" cy="0"/>
           </a:xfrm>
           <a:prstGeom prst="straightConnector1">
             <a:avLst/>
@@ -11849,8 +11841,8 @@
           </a:fontRef>
         </p:style>
       </p:cxnSp>
-      <mc:AlternateContent xmlns:mc="http://schemas.openxmlformats.org/markup-compatibility/2006">
-        <mc:Choice xmlns:a14="http://schemas.microsoft.com/office/drawing/2010/main" Requires="a14">
+      <mc:AlternateContent xmlns:mc="http://schemas.openxmlformats.org/markup-compatibility/2006" xmlns:a14="http://schemas.microsoft.com/office/drawing/2010/main">
+        <mc:Choice Requires="a14">
           <p:sp>
             <p:nvSpPr>
               <p:cNvPr id="169" name="TextBox 168">
@@ -12600,7 +12592,7 @@
             </p:txBody>
           </p:sp>
         </mc:Choice>
-        <mc:Fallback>
+        <mc:Fallback xmlns="">
           <p:sp>
             <p:nvSpPr>
               <p:cNvPr id="169" name="TextBox 168">

</xml_diff>

<commit_message>
Update based on review of invention background
</commit_message>
<xml_diff>
--- a/figures/Powerpoint/DesginFlowcharts.pptx
+++ b/figures/Powerpoint/DesginFlowcharts.pptx
@@ -246,7 +246,7 @@
           <a:p>
             <a:fld id="{7854B9CE-4D77-C740-9A68-E4BD7A7A0860}" type="datetimeFigureOut">
               <a:rPr lang="en-GB" smtClean="0"/>
-              <a:t>28/06/2019</a:t>
+              <a:t>17/07/2019</a:t>
             </a:fld>
             <a:endParaRPr lang="en-GB"/>
           </a:p>
@@ -416,7 +416,7 @@
           <a:p>
             <a:fld id="{7854B9CE-4D77-C740-9A68-E4BD7A7A0860}" type="datetimeFigureOut">
               <a:rPr lang="en-GB" smtClean="0"/>
-              <a:t>28/06/2019</a:t>
+              <a:t>17/07/2019</a:t>
             </a:fld>
             <a:endParaRPr lang="en-GB"/>
           </a:p>
@@ -596,7 +596,7 @@
           <a:p>
             <a:fld id="{7854B9CE-4D77-C740-9A68-E4BD7A7A0860}" type="datetimeFigureOut">
               <a:rPr lang="en-GB" smtClean="0"/>
-              <a:t>28/06/2019</a:t>
+              <a:t>17/07/2019</a:t>
             </a:fld>
             <a:endParaRPr lang="en-GB"/>
           </a:p>
@@ -766,7 +766,7 @@
           <a:p>
             <a:fld id="{7854B9CE-4D77-C740-9A68-E4BD7A7A0860}" type="datetimeFigureOut">
               <a:rPr lang="en-GB" smtClean="0"/>
-              <a:t>28/06/2019</a:t>
+              <a:t>17/07/2019</a:t>
             </a:fld>
             <a:endParaRPr lang="en-GB"/>
           </a:p>
@@ -1010,7 +1010,7 @@
           <a:p>
             <a:fld id="{7854B9CE-4D77-C740-9A68-E4BD7A7A0860}" type="datetimeFigureOut">
               <a:rPr lang="en-GB" smtClean="0"/>
-              <a:t>28/06/2019</a:t>
+              <a:t>17/07/2019</a:t>
             </a:fld>
             <a:endParaRPr lang="en-GB"/>
           </a:p>
@@ -1242,7 +1242,7 @@
           <a:p>
             <a:fld id="{7854B9CE-4D77-C740-9A68-E4BD7A7A0860}" type="datetimeFigureOut">
               <a:rPr lang="en-GB" smtClean="0"/>
-              <a:t>28/06/2019</a:t>
+              <a:t>17/07/2019</a:t>
             </a:fld>
             <a:endParaRPr lang="en-GB"/>
           </a:p>
@@ -1609,7 +1609,7 @@
           <a:p>
             <a:fld id="{7854B9CE-4D77-C740-9A68-E4BD7A7A0860}" type="datetimeFigureOut">
               <a:rPr lang="en-GB" smtClean="0"/>
-              <a:t>28/06/2019</a:t>
+              <a:t>17/07/2019</a:t>
             </a:fld>
             <a:endParaRPr lang="en-GB"/>
           </a:p>
@@ -1727,7 +1727,7 @@
           <a:p>
             <a:fld id="{7854B9CE-4D77-C740-9A68-E4BD7A7A0860}" type="datetimeFigureOut">
               <a:rPr lang="en-GB" smtClean="0"/>
-              <a:t>28/06/2019</a:t>
+              <a:t>17/07/2019</a:t>
             </a:fld>
             <a:endParaRPr lang="en-GB"/>
           </a:p>
@@ -1822,7 +1822,7 @@
           <a:p>
             <a:fld id="{7854B9CE-4D77-C740-9A68-E4BD7A7A0860}" type="datetimeFigureOut">
               <a:rPr lang="en-GB" smtClean="0"/>
-              <a:t>28/06/2019</a:t>
+              <a:t>17/07/2019</a:t>
             </a:fld>
             <a:endParaRPr lang="en-GB"/>
           </a:p>
@@ -2099,7 +2099,7 @@
           <a:p>
             <a:fld id="{7854B9CE-4D77-C740-9A68-E4BD7A7A0860}" type="datetimeFigureOut">
               <a:rPr lang="en-GB" smtClean="0"/>
-              <a:t>28/06/2019</a:t>
+              <a:t>17/07/2019</a:t>
             </a:fld>
             <a:endParaRPr lang="en-GB"/>
           </a:p>
@@ -2356,7 +2356,7 @@
           <a:p>
             <a:fld id="{7854B9CE-4D77-C740-9A68-E4BD7A7A0860}" type="datetimeFigureOut">
               <a:rPr lang="en-GB" smtClean="0"/>
-              <a:t>28/06/2019</a:t>
+              <a:t>17/07/2019</a:t>
             </a:fld>
             <a:endParaRPr lang="en-GB"/>
           </a:p>
@@ -2569,7 +2569,7 @@
           <a:p>
             <a:fld id="{7854B9CE-4D77-C740-9A68-E4BD7A7A0860}" type="datetimeFigureOut">
               <a:rPr lang="en-GB" smtClean="0"/>
-              <a:t>28/06/2019</a:t>
+              <a:t>17/07/2019</a:t>
             </a:fld>
             <a:endParaRPr lang="en-GB"/>
           </a:p>
@@ -4071,8 +4071,8 @@
           </p:sp>
         </mc:Fallback>
       </mc:AlternateContent>
-      <mc:AlternateContent xmlns:mc="http://schemas.openxmlformats.org/markup-compatibility/2006" xmlns:a14="http://schemas.microsoft.com/office/drawing/2010/main">
-        <mc:Choice Requires="a14">
+      <mc:AlternateContent xmlns:mc="http://schemas.openxmlformats.org/markup-compatibility/2006">
+        <mc:Choice xmlns:a14="http://schemas.microsoft.com/office/drawing/2010/main" Requires="a14">
           <p:sp>
             <p:nvSpPr>
               <p:cNvPr id="24" name="TextBox 23">
@@ -4376,8 +4376,9 @@
                     <m:r>
                       <a:rPr lang="en-GB" b="0" i="1" dirty="0" smtClean="0">
                         <a:latin typeface="Cambria Math" panose="02040503050406030204" pitchFamily="18" charset="0"/>
+                        <a:ea typeface="Cambria Math" panose="02040503050406030204" pitchFamily="18" charset="0"/>
                       </a:rPr>
-                      <m:t>𝑠</m:t>
+                      <m:t>𝜎</m:t>
                     </m:r>
                   </m:oMath>
                 </a14:m>
@@ -4573,7 +4574,7 @@
             </p:txBody>
           </p:sp>
         </mc:Choice>
-        <mc:Fallback xmlns="">
+        <mc:Fallback>
           <p:sp>
             <p:nvSpPr>
               <p:cNvPr id="24" name="TextBox 23">
@@ -4613,7 +4614,7 @@
               <a:lstStyle/>
               <a:p>
                 <a:r>
-                  <a:rPr lang="en-US">
+                  <a:rPr lang="en-GB">
                     <a:noFill/>
                   </a:rPr>
                   <a:t> </a:t>
@@ -6368,8 +6369,8 @@
           </a:p>
         </p:txBody>
       </p:sp>
-      <mc:AlternateContent xmlns:mc="http://schemas.openxmlformats.org/markup-compatibility/2006">
-        <mc:Choice xmlns:a14="http://schemas.microsoft.com/office/drawing/2010/main" Requires="a14">
+      <mc:AlternateContent xmlns:mc="http://schemas.openxmlformats.org/markup-compatibility/2006" xmlns:a14="http://schemas.microsoft.com/office/drawing/2010/main">
+        <mc:Choice Requires="a14">
           <p:sp>
             <p:nvSpPr>
               <p:cNvPr id="58" name="TextBox 57">
@@ -6441,7 +6442,7 @@
             </p:txBody>
           </p:sp>
         </mc:Choice>
-        <mc:Fallback>
+        <mc:Fallback xmlns="">
           <p:sp>
             <p:nvSpPr>
               <p:cNvPr id="58" name="TextBox 57">

</xml_diff>